<commit_message>
fixed documentation - added slide
</commit_message>
<xml_diff>
--- a/docs/Architecture_love_article.pptx
+++ b/docs/Architecture_love_article.pptx
@@ -105,6 +105,11 @@
       </a:defRPr>
     </a:lvl9pPr>
   </p:defaultTextStyle>
+  <p:extLst>
+    <p:ext uri="{EFAFB233-063F-42B5-8137-9DF3F51BA10A}">
+      <p15:sldGuideLst xmlns:p15="http://schemas.microsoft.com/office/powerpoint/2012/main"/>
+    </p:ext>
+  </p:extLst>
 </p:presentation>
 </file>
 
@@ -255,7 +260,7 @@
           <a:p>
             <a:fld id="{E70480FA-B9D3-0E4B-BA9D-F1258085C642}" type="datetimeFigureOut">
               <a:rPr lang="it-IT" smtClean="0"/>
-              <a:t>09/03/20</a:t>
+              <a:t>16/04/20</a:t>
             </a:fld>
             <a:endParaRPr lang="it-IT"/>
           </a:p>
@@ -453,7 +458,7 @@
           <a:p>
             <a:fld id="{E70480FA-B9D3-0E4B-BA9D-F1258085C642}" type="datetimeFigureOut">
               <a:rPr lang="it-IT" smtClean="0"/>
-              <a:t>09/03/20</a:t>
+              <a:t>16/04/20</a:t>
             </a:fld>
             <a:endParaRPr lang="it-IT"/>
           </a:p>
@@ -661,7 +666,7 @@
           <a:p>
             <a:fld id="{E70480FA-B9D3-0E4B-BA9D-F1258085C642}" type="datetimeFigureOut">
               <a:rPr lang="it-IT" smtClean="0"/>
-              <a:t>09/03/20</a:t>
+              <a:t>16/04/20</a:t>
             </a:fld>
             <a:endParaRPr lang="it-IT"/>
           </a:p>
@@ -859,7 +864,7 @@
           <a:p>
             <a:fld id="{E70480FA-B9D3-0E4B-BA9D-F1258085C642}" type="datetimeFigureOut">
               <a:rPr lang="it-IT" smtClean="0"/>
-              <a:t>09/03/20</a:t>
+              <a:t>16/04/20</a:t>
             </a:fld>
             <a:endParaRPr lang="it-IT"/>
           </a:p>
@@ -1134,7 +1139,7 @@
           <a:p>
             <a:fld id="{E70480FA-B9D3-0E4B-BA9D-F1258085C642}" type="datetimeFigureOut">
               <a:rPr lang="it-IT" smtClean="0"/>
-              <a:t>09/03/20</a:t>
+              <a:t>16/04/20</a:t>
             </a:fld>
             <a:endParaRPr lang="it-IT"/>
           </a:p>
@@ -1399,7 +1404,7 @@
           <a:p>
             <a:fld id="{E70480FA-B9D3-0E4B-BA9D-F1258085C642}" type="datetimeFigureOut">
               <a:rPr lang="it-IT" smtClean="0"/>
-              <a:t>09/03/20</a:t>
+              <a:t>16/04/20</a:t>
             </a:fld>
             <a:endParaRPr lang="it-IT"/>
           </a:p>
@@ -1811,7 +1816,7 @@
           <a:p>
             <a:fld id="{E70480FA-B9D3-0E4B-BA9D-F1258085C642}" type="datetimeFigureOut">
               <a:rPr lang="it-IT" smtClean="0"/>
-              <a:t>09/03/20</a:t>
+              <a:t>16/04/20</a:t>
             </a:fld>
             <a:endParaRPr lang="it-IT"/>
           </a:p>
@@ -1952,7 +1957,7 @@
           <a:p>
             <a:fld id="{E70480FA-B9D3-0E4B-BA9D-F1258085C642}" type="datetimeFigureOut">
               <a:rPr lang="it-IT" smtClean="0"/>
-              <a:t>09/03/20</a:t>
+              <a:t>16/04/20</a:t>
             </a:fld>
             <a:endParaRPr lang="it-IT"/>
           </a:p>
@@ -2065,7 +2070,7 @@
           <a:p>
             <a:fld id="{E70480FA-B9D3-0E4B-BA9D-F1258085C642}" type="datetimeFigureOut">
               <a:rPr lang="it-IT" smtClean="0"/>
-              <a:t>09/03/20</a:t>
+              <a:t>16/04/20</a:t>
             </a:fld>
             <a:endParaRPr lang="it-IT"/>
           </a:p>
@@ -2376,7 +2381,7 @@
           <a:p>
             <a:fld id="{E70480FA-B9D3-0E4B-BA9D-F1258085C642}" type="datetimeFigureOut">
               <a:rPr lang="it-IT" smtClean="0"/>
-              <a:t>09/03/20</a:t>
+              <a:t>16/04/20</a:t>
             </a:fld>
             <a:endParaRPr lang="it-IT"/>
           </a:p>
@@ -2664,7 +2669,7 @@
           <a:p>
             <a:fld id="{E70480FA-B9D3-0E4B-BA9D-F1258085C642}" type="datetimeFigureOut">
               <a:rPr lang="it-IT" smtClean="0"/>
-              <a:t>09/03/20</a:t>
+              <a:t>16/04/20</a:t>
             </a:fld>
             <a:endParaRPr lang="it-IT"/>
           </a:p>
@@ -2905,7 +2910,7 @@
           <a:p>
             <a:fld id="{E70480FA-B9D3-0E4B-BA9D-F1258085C642}" type="datetimeFigureOut">
               <a:rPr lang="it-IT" smtClean="0"/>
-              <a:t>09/03/20</a:t>
+              <a:t>16/04/20</a:t>
             </a:fld>
             <a:endParaRPr lang="it-IT"/>
           </a:p>
@@ -4729,7 +4734,7 @@
           <p:spPr>
             <a:xfrm>
               <a:off x="2638600" y="2500756"/>
-              <a:ext cx="1219006" cy="590782"/>
+              <a:ext cx="1219006" cy="590783"/>
             </a:xfrm>
             <a:prstGeom prst="rect">
               <a:avLst/>
@@ -4745,7 +4750,7 @@
               <a:pPr algn="ctr"/>
               <a:r>
                 <a:rPr lang="it-IT" sz="1200" dirty="0" err="1"/>
-                <a:t>Favorites</a:t>
+                <a:t>Statistics</a:t>
               </a:r>
               <a:endParaRPr lang="it-IT" sz="1200" dirty="0"/>
             </a:p>
@@ -4846,7 +4851,7 @@
           <p:spPr>
             <a:xfrm>
               <a:off x="2638600" y="2500756"/>
-              <a:ext cx="1219006" cy="590782"/>
+              <a:ext cx="1219006" cy="590783"/>
             </a:xfrm>
             <a:prstGeom prst="rect">
               <a:avLst/>
@@ -4862,7 +4867,7 @@
               <a:pPr algn="ctr"/>
               <a:r>
                 <a:rPr lang="it-IT" sz="1200" dirty="0" err="1"/>
-                <a:t>Favorites</a:t>
+                <a:t>Articles</a:t>
               </a:r>
               <a:endParaRPr lang="it-IT" sz="1200" dirty="0"/>
             </a:p>

</xml_diff>